<commit_message>
Minor changes to poster.
</commit_message>
<xml_diff>
--- a/poster/poster_v1.2.pptx
+++ b/poster/poster_v1.2.pptx
@@ -15,513 +15,7 @@
 </p:presentation>
 </file>
 
-<file path=ppt/charts/chart1.xml><?xml version="1.0" encoding="utf-8"?>
-<c:chartSpace xmlns:c="http://schemas.openxmlformats.org/drawingml/2006/chart" xmlns:a="http://schemas.openxmlformats.org/drawingml/2006/main" xmlns:r="http://schemas.openxmlformats.org/officeDocument/2006/relationships">
-  <c:lang val="en-US"/>
-  <c:chart>
-    <c:title>
-      <c:tx>
-        <c:rich>
-          <a:bodyPr/>
-          <a:lstStyle/>
-          <a:p>
-            <a:pPr>
-              <a:defRPr/>
-            </a:pPr>
-            <a:r>
-              <a:rPr b="1">
-                <a:solidFill>
-                  <a:srgbClr val="000000"/>
-                </a:solidFill>
-                <a:latin typeface="Times New Roman"/>
-                <a:ea typeface="ＭＳ Ｐゴシック"/>
-              </a:rPr>
-              <a:t>Distribution of videos over view counts</a:t>
-            </a:r>
-          </a:p>
-        </c:rich>
-      </c:tx>
-      <c:layout/>
-    </c:title>
-    <c:plotArea>
-      <c:layout/>
-      <c:barChart>
-        <c:barDir val="col"/>
-        <c:grouping val="clustered"/>
-        <c:ser>
-          <c:idx val="0"/>
-          <c:order val="0"/>
-          <c:tx>
-            <c:strRef>
-              <c:f>label 3</c:f>
-              <c:strCache>
-                <c:ptCount val="1"/>
-                <c:pt idx="0">
-                  <c:v>No of videos</c:v>
-                </c:pt>
-              </c:strCache>
-            </c:strRef>
-          </c:tx>
-          <c:spPr>
-            <a:solidFill>
-              <a:srgbClr val="4f81bd"/>
-            </a:solidFill>
-            <a:ln>
-              <a:noFill/>
-            </a:ln>
-          </c:spPr>
-          <c:cat>
-            <c:strRef>
-              <c:f>categories</c:f>
-              <c:strCache>
-                <c:ptCount val="11"/>
-                <c:pt idx="0">
-                  <c:v>1</c:v>
-                </c:pt>
-                <c:pt idx="1">
-                  <c:v>10</c:v>
-                </c:pt>
-                <c:pt idx="2">
-                  <c:v>100</c:v>
-                </c:pt>
-                <c:pt idx="3">
-                  <c:v>1000</c:v>
-                </c:pt>
-                <c:pt idx="4">
-                  <c:v>10000</c:v>
-                </c:pt>
-                <c:pt idx="5">
-                  <c:v>10000</c:v>
-                </c:pt>
-                <c:pt idx="6">
-                  <c:v>1000000</c:v>
-                </c:pt>
-                <c:pt idx="7">
-                  <c:v>10000000</c:v>
-                </c:pt>
-                <c:pt idx="8">
-                  <c:v>100000000</c:v>
-                </c:pt>
-                <c:pt idx="9">
-                  <c:v>1000000000</c:v>
-                </c:pt>
-                <c:pt idx="10">
-                  <c:v>10000000000</c:v>
-                </c:pt>
-              </c:strCache>
-            </c:strRef>
-          </c:cat>
-          <c:val>
-            <c:numRef>
-              <c:f>3</c:f>
-              <c:numCache>
-                <c:formatCode>General</c:formatCode>
-                <c:ptCount val="11"/>
-                <c:pt idx="0">
-                  <c:v>0</c:v>
-                </c:pt>
-                <c:pt idx="1">
-                  <c:v>3</c:v>
-                </c:pt>
-                <c:pt idx="2">
-                  <c:v>487</c:v>
-                </c:pt>
-                <c:pt idx="3">
-                  <c:v>23103</c:v>
-                </c:pt>
-                <c:pt idx="4">
-                  <c:v>217964</c:v>
-                </c:pt>
-                <c:pt idx="5">
-                  <c:v>566240</c:v>
-                </c:pt>
-                <c:pt idx="6">
-                  <c:v>466896</c:v>
-                </c:pt>
-                <c:pt idx="7">
-                  <c:v>140560</c:v>
-                </c:pt>
-                <c:pt idx="8">
-                  <c:v>15601</c:v>
-                </c:pt>
-                <c:pt idx="9">
-                  <c:v>1349</c:v>
-                </c:pt>
-                <c:pt idx="10">
-                  <c:v>10</c:v>
-                </c:pt>
-              </c:numCache>
-            </c:numRef>
-          </c:val>
-        </c:ser>
-        <c:gapWidth val="0"/>
-        <c:axId val="8197"/>
-        <c:axId val="11606"/>
-      </c:barChart>
-      <c:catAx>
-        <c:axId val="8197"/>
-        <c:scaling>
-          <c:orientation val="minMax"/>
-        </c:scaling>
-        <c:delete val="0"/>
-        <c:axPos val="b"/>
-        <c:title>
-          <c:tx>
-            <c:rich>
-              <a:bodyPr/>
-              <a:lstStyle/>
-              <a:p>
-                <a:pPr>
-                  <a:defRPr/>
-                </a:pPr>
-                <a:r>
-                  <a:rPr b="1" sz="1000">
-                    <a:solidFill>
-                      <a:srgbClr val="000000"/>
-                    </a:solidFill>
-                    <a:latin typeface="Times New Roman"/>
-                    <a:ea typeface="ＭＳ Ｐゴシック"/>
-                  </a:rPr>
-                  <a:t>Number of views</a:t>
-                </a:r>
-              </a:p>
-            </c:rich>
-          </c:tx>
-          <c:layout/>
-        </c:title>
-        <c:majorTickMark val="out"/>
-        <c:minorTickMark val="none"/>
-        <c:tickLblPos val="nextTo"/>
-        <c:spPr>
-          <a:ln w="9360">
-            <a:solidFill>
-              <a:srgbClr val="878787"/>
-            </a:solidFill>
-            <a:round/>
-          </a:ln>
-        </c:spPr>
-        <c:crossAx val="11606"/>
-        <c:crosses val="autoZero"/>
-        <c:auto val="1"/>
-        <c:lblAlgn val="ctr"/>
-        <c:lblOffset val="100"/>
-      </c:catAx>
-      <c:valAx>
-        <c:axId val="11606"/>
-        <c:scaling>
-          <c:orientation val="minMax"/>
-        </c:scaling>
-        <c:delete val="0"/>
-        <c:axPos val="l"/>
-        <c:title>
-          <c:tx>
-            <c:rich>
-              <a:bodyPr/>
-              <a:lstStyle/>
-              <a:p>
-                <a:pPr>
-                  <a:defRPr/>
-                </a:pPr>
-                <a:r>
-                  <a:rPr b="1" sz="1000">
-                    <a:solidFill>
-                      <a:srgbClr val="000000"/>
-                    </a:solidFill>
-                    <a:latin typeface="Times New Roman"/>
-                    <a:ea typeface="ＭＳ Ｐゴシック"/>
-                  </a:rPr>
-                  <a:t>Number of videos</a:t>
-                </a:r>
-              </a:p>
-            </c:rich>
-          </c:tx>
-          <c:layout/>
-        </c:title>
-        <c:majorTickMark val="out"/>
-        <c:minorTickMark val="none"/>
-        <c:tickLblPos val="nextTo"/>
-        <c:spPr>
-          <a:ln w="9360">
-            <a:solidFill>
-              <a:srgbClr val="878787"/>
-            </a:solidFill>
-            <a:round/>
-          </a:ln>
-        </c:spPr>
-        <c:crossAx val="8197"/>
-        <c:crossesAt val="0"/>
-      </c:valAx>
-      <c:spPr>
-        <a:noFill/>
-        <a:ln w="25560">
-          <a:noFill/>
-        </a:ln>
-      </c:spPr>
-    </c:plotArea>
-    <c:plotVisOnly val="1"/>
-  </c:chart>
-  <c:spPr>
-    <a:noFill/>
-    <a:ln>
-      <a:solidFill>
-        <a:srgbClr val="000000"/>
-      </a:solidFill>
-    </a:ln>
-  </c:spPr>
-</c:chartSpace>
-</file>
-
-<file path=ppt/charts/chart2.xml><?xml version="1.0" encoding="utf-8"?>
-<c:chartSpace xmlns:c="http://schemas.openxmlformats.org/drawingml/2006/chart" xmlns:a="http://schemas.openxmlformats.org/drawingml/2006/main" xmlns:r="http://schemas.openxmlformats.org/officeDocument/2006/relationships">
-  <c:lang val="en-US"/>
-  <c:chart>
-    <c:title>
-      <c:tx>
-        <c:rich>
-          <a:bodyPr/>
-          <a:lstStyle/>
-          <a:p>
-            <a:pPr>
-              <a:defRPr/>
-            </a:pPr>
-            <a:r>
-              <a:rPr b="1">
-                <a:solidFill>
-                  <a:srgbClr val="000000"/>
-                </a:solidFill>
-                <a:latin typeface="Times New Roman"/>
-                <a:ea typeface="ＭＳ Ｐゴシック"/>
-              </a:rPr>
-              <a:t>Distribution of uploaders over no of uploaded videos</a:t>
-            </a:r>
-          </a:p>
-        </c:rich>
-      </c:tx>
-      <c:layout/>
-    </c:title>
-    <c:plotArea>
-      <c:layout/>
-      <c:barChart>
-        <c:barDir val="col"/>
-        <c:grouping val="clustered"/>
-        <c:ser>
-          <c:idx val="0"/>
-          <c:order val="0"/>
-          <c:tx>
-            <c:strRef>
-              <c:f>label 3</c:f>
-              <c:strCache>
-                <c:ptCount val="1"/>
-                <c:pt idx="0">
-                  <c:v>Number of users</c:v>
-                </c:pt>
-              </c:strCache>
-            </c:strRef>
-          </c:tx>
-          <c:spPr>
-            <a:solidFill>
-              <a:srgbClr val="4f81bd"/>
-            </a:solidFill>
-            <a:ln>
-              <a:noFill/>
-            </a:ln>
-          </c:spPr>
-          <c:cat>
-            <c:strRef>
-              <c:f>categories</c:f>
-              <c:strCache>
-                <c:ptCount val="10"/>
-                <c:pt idx="0">
-                  <c:v>158</c:v>
-                </c:pt>
-                <c:pt idx="1">
-                  <c:v>472</c:v>
-                </c:pt>
-                <c:pt idx="2">
-                  <c:v>786</c:v>
-                </c:pt>
-                <c:pt idx="3">
-                  <c:v>1099</c:v>
-                </c:pt>
-                <c:pt idx="4">
-                  <c:v>1413</c:v>
-                </c:pt>
-                <c:pt idx="5">
-                  <c:v>1727</c:v>
-                </c:pt>
-                <c:pt idx="6">
-                  <c:v>2041</c:v>
-                </c:pt>
-                <c:pt idx="7">
-                  <c:v>2355</c:v>
-                </c:pt>
-                <c:pt idx="8">
-                  <c:v>2668</c:v>
-                </c:pt>
-                <c:pt idx="9">
-                  <c:v>2982</c:v>
-                </c:pt>
-              </c:strCache>
-            </c:strRef>
-          </c:cat>
-          <c:val>
-            <c:numRef>
-              <c:f>3</c:f>
-              <c:numCache>
-                <c:formatCode>General</c:formatCode>
-                <c:ptCount val="10"/>
-                <c:pt idx="0">
-                  <c:v>627973</c:v>
-                </c:pt>
-                <c:pt idx="1">
-                  <c:v>65</c:v>
-                </c:pt>
-                <c:pt idx="2">
-                  <c:v>16</c:v>
-                </c:pt>
-                <c:pt idx="3">
-                  <c:v>9</c:v>
-                </c:pt>
-                <c:pt idx="4">
-                  <c:v>3</c:v>
-                </c:pt>
-                <c:pt idx="5">
-                  <c:v>2</c:v>
-                </c:pt>
-                <c:pt idx="6">
-                  <c:v>0</c:v>
-                </c:pt>
-                <c:pt idx="7">
-                  <c:v>1</c:v>
-                </c:pt>
-                <c:pt idx="8">
-                  <c:v>1</c:v>
-                </c:pt>
-                <c:pt idx="9">
-                  <c:v>2</c:v>
-                </c:pt>
-              </c:numCache>
-            </c:numRef>
-          </c:val>
-        </c:ser>
-        <c:gapWidth val="0"/>
-        <c:axId val="32378"/>
-        <c:axId val="19321"/>
-      </c:barChart>
-      <c:catAx>
-        <c:axId val="32378"/>
-        <c:scaling>
-          <c:orientation val="minMax"/>
-        </c:scaling>
-        <c:delete val="0"/>
-        <c:axPos val="b"/>
-        <c:title>
-          <c:tx>
-            <c:rich>
-              <a:bodyPr/>
-              <a:lstStyle/>
-              <a:p>
-                <a:pPr>
-                  <a:defRPr/>
-                </a:pPr>
-                <a:r>
-                  <a:rPr b="1" sz="1000">
-                    <a:solidFill>
-                      <a:srgbClr val="000000"/>
-                    </a:solidFill>
-                    <a:latin typeface="Times New Roman"/>
-                    <a:ea typeface="ＭＳ Ｐゴシック"/>
-                  </a:rPr>
-                  <a:t>Number of uploaded videos</a:t>
-                </a:r>
-              </a:p>
-            </c:rich>
-          </c:tx>
-          <c:layout/>
-        </c:title>
-        <c:majorTickMark val="out"/>
-        <c:minorTickMark val="none"/>
-        <c:tickLblPos val="nextTo"/>
-        <c:spPr>
-          <a:ln w="9360">
-            <a:solidFill>
-              <a:srgbClr val="878787"/>
-            </a:solidFill>
-            <a:round/>
-          </a:ln>
-        </c:spPr>
-        <c:crossAx val="19321"/>
-        <c:crosses val="autoZero"/>
-        <c:auto val="1"/>
-        <c:lblAlgn val="ctr"/>
-        <c:lblOffset val="100"/>
-      </c:catAx>
-      <c:valAx>
-        <c:axId val="19321"/>
-        <c:scaling>
-          <c:orientation val="minMax"/>
-        </c:scaling>
-        <c:delete val="0"/>
-        <c:axPos val="l"/>
-        <c:title>
-          <c:tx>
-            <c:rich>
-              <a:bodyPr/>
-              <a:lstStyle/>
-              <a:p>
-                <a:pPr>
-                  <a:defRPr/>
-                </a:pPr>
-                <a:r>
-                  <a:rPr b="1" sz="1000">
-                    <a:solidFill>
-                      <a:srgbClr val="000000"/>
-                    </a:solidFill>
-                    <a:latin typeface="Times New Roman"/>
-                    <a:ea typeface="ＭＳ Ｐゴシック"/>
-                  </a:rPr>
-                  <a:t>Number of uploaders</a:t>
-                </a:r>
-              </a:p>
-            </c:rich>
-          </c:tx>
-          <c:layout/>
-        </c:title>
-        <c:majorTickMark val="out"/>
-        <c:minorTickMark val="none"/>
-        <c:tickLblPos val="nextTo"/>
-        <c:spPr>
-          <a:ln w="9360">
-            <a:solidFill>
-              <a:srgbClr val="878787"/>
-            </a:solidFill>
-            <a:round/>
-          </a:ln>
-        </c:spPr>
-        <c:crossAx val="32378"/>
-        <c:crossesAt val="0"/>
-      </c:valAx>
-      <c:spPr>
-        <a:noFill/>
-        <a:ln w="25560">
-          <a:noFill/>
-        </a:ln>
-      </c:spPr>
-    </c:plotArea>
-    <c:plotVisOnly val="1"/>
-  </c:chart>
-  <c:spPr>
-    <a:noFill/>
-    <a:ln>
-      <a:solidFill>
-        <a:srgbClr val="000000"/>
-      </a:solidFill>
-    </a:ln>
-  </c:spPr>
-</c:chartSpace>
-</file>
-
-<file path=ppt/charts/chart3.xml><?xml version="1.0" encoding="utf-8"?>
+<file path=ppt/charts/chart4.xml><?xml version="1.0" encoding="utf-8"?>
 <c:chartSpace xmlns:c="http://schemas.openxmlformats.org/drawingml/2006/chart" xmlns:a="http://schemas.openxmlformats.org/drawingml/2006/main" xmlns:r="http://schemas.openxmlformats.org/officeDocument/2006/relationships">
   <c:lang val="en-US"/>
   <c:chart>
@@ -3299,8 +2793,8 @@
             </c:numRef>
           </c:yVal>
         </c:ser>
-        <c:axId val="24620"/>
-        <c:axId val="14385"/>
+        <c:axId val="5819"/>
+        <c:axId val="29739"/>
       </c:scatterChart>
       <c:scatterChart>
         <c:scatterStyle val="lineMarker"/>
@@ -6053,11 +5547,11 @@
             </c:numRef>
           </c:yVal>
         </c:ser>
-        <c:axId val="4661"/>
-        <c:axId val="12444"/>
+        <c:axId val="28416"/>
+        <c:axId val="6404"/>
       </c:scatterChart>
       <c:valAx>
-        <c:axId val="24620"/>
+        <c:axId val="5819"/>
         <c:scaling>
           <c:orientation val="minMax"/>
           <c:max val="3200"/>
@@ -6100,12 +5594,12 @@
             <a:round/>
           </a:ln>
         </c:spPr>
-        <c:crossAx val="14385"/>
+        <c:crossAx val="29739"/>
         <c:crossesAt val="0"/>
         <c:majorUnit val="200"/>
       </c:valAx>
       <c:valAx>
-        <c:axId val="14385"/>
+        <c:axId val="29739"/>
         <c:scaling>
           <c:orientation val="minMax"/>
         </c:scaling>
@@ -6146,11 +5640,11 @@
             <a:round/>
           </a:ln>
         </c:spPr>
-        <c:crossAx val="24620"/>
+        <c:crossAx val="5819"/>
         <c:crossesAt val="0"/>
       </c:valAx>
       <c:valAx>
-        <c:axId val="4661"/>
+        <c:axId val="28416"/>
         <c:scaling>
           <c:orientation val="minMax"/>
           <c:max val="3200"/>
@@ -6193,12 +5687,12 @@
             <a:round/>
           </a:ln>
         </c:spPr>
-        <c:crossAx val="12444"/>
+        <c:crossAx val="6404"/>
         <c:crossesAt val="0"/>
         <c:majorUnit val="200"/>
       </c:valAx>
       <c:valAx>
-        <c:axId val="12444"/>
+        <c:axId val="6404"/>
         <c:scaling>
           <c:orientation val="minMax"/>
         </c:scaling>
@@ -6239,7 +5733,7 @@
             <a:round/>
           </a:ln>
         </c:spPr>
-        <c:crossAx val="4661"/>
+        <c:crossAx val="28416"/>
         <c:crossesAt val="0"/>
       </c:valAx>
       <c:spPr>
@@ -6247,6 +5741,512 @@
           <a:srgbClr val="ffffff"/>
         </a:solidFill>
         <a:ln>
+          <a:noFill/>
+        </a:ln>
+      </c:spPr>
+    </c:plotArea>
+    <c:plotVisOnly val="1"/>
+  </c:chart>
+  <c:spPr>
+    <a:noFill/>
+    <a:ln>
+      <a:solidFill>
+        <a:srgbClr val="000000"/>
+      </a:solidFill>
+    </a:ln>
+  </c:spPr>
+</c:chartSpace>
+</file>
+
+<file path=ppt/charts/chart5.xml><?xml version="1.0" encoding="utf-8"?>
+<c:chartSpace xmlns:c="http://schemas.openxmlformats.org/drawingml/2006/chart" xmlns:a="http://schemas.openxmlformats.org/drawingml/2006/main" xmlns:r="http://schemas.openxmlformats.org/officeDocument/2006/relationships">
+  <c:lang val="en-US"/>
+  <c:chart>
+    <c:title>
+      <c:tx>
+        <c:rich>
+          <a:bodyPr/>
+          <a:lstStyle/>
+          <a:p>
+            <a:pPr>
+              <a:defRPr/>
+            </a:pPr>
+            <a:r>
+              <a:rPr b="1">
+                <a:solidFill>
+                  <a:srgbClr val="000000"/>
+                </a:solidFill>
+                <a:latin typeface="Times New Roman"/>
+                <a:ea typeface="ＭＳ Ｐゴシック"/>
+              </a:rPr>
+              <a:t>Distribution of videos over view counts</a:t>
+            </a:r>
+          </a:p>
+        </c:rich>
+      </c:tx>
+      <c:layout/>
+    </c:title>
+    <c:plotArea>
+      <c:layout/>
+      <c:barChart>
+        <c:barDir val="col"/>
+        <c:grouping val="clustered"/>
+        <c:ser>
+          <c:idx val="0"/>
+          <c:order val="0"/>
+          <c:tx>
+            <c:strRef>
+              <c:f>label 3</c:f>
+              <c:strCache>
+                <c:ptCount val="1"/>
+                <c:pt idx="0">
+                  <c:v>No of videos</c:v>
+                </c:pt>
+              </c:strCache>
+            </c:strRef>
+          </c:tx>
+          <c:spPr>
+            <a:solidFill>
+              <a:srgbClr val="4f81bd"/>
+            </a:solidFill>
+            <a:ln>
+              <a:noFill/>
+            </a:ln>
+          </c:spPr>
+          <c:cat>
+            <c:strRef>
+              <c:f>categories</c:f>
+              <c:strCache>
+                <c:ptCount val="11"/>
+                <c:pt idx="0">
+                  <c:v>1</c:v>
+                </c:pt>
+                <c:pt idx="1">
+                  <c:v>10</c:v>
+                </c:pt>
+                <c:pt idx="2">
+                  <c:v>100</c:v>
+                </c:pt>
+                <c:pt idx="3">
+                  <c:v>1000</c:v>
+                </c:pt>
+                <c:pt idx="4">
+                  <c:v>10000</c:v>
+                </c:pt>
+                <c:pt idx="5">
+                  <c:v>10000</c:v>
+                </c:pt>
+                <c:pt idx="6">
+                  <c:v>1000000</c:v>
+                </c:pt>
+                <c:pt idx="7">
+                  <c:v>10000000</c:v>
+                </c:pt>
+                <c:pt idx="8">
+                  <c:v>100000000</c:v>
+                </c:pt>
+                <c:pt idx="9">
+                  <c:v>1000000000</c:v>
+                </c:pt>
+                <c:pt idx="10">
+                  <c:v>10000000000</c:v>
+                </c:pt>
+              </c:strCache>
+            </c:strRef>
+          </c:cat>
+          <c:val>
+            <c:numRef>
+              <c:f>3</c:f>
+              <c:numCache>
+                <c:formatCode>General</c:formatCode>
+                <c:ptCount val="11"/>
+                <c:pt idx="0">
+                  <c:v>0</c:v>
+                </c:pt>
+                <c:pt idx="1">
+                  <c:v>3</c:v>
+                </c:pt>
+                <c:pt idx="2">
+                  <c:v>487</c:v>
+                </c:pt>
+                <c:pt idx="3">
+                  <c:v>23103</c:v>
+                </c:pt>
+                <c:pt idx="4">
+                  <c:v>217964</c:v>
+                </c:pt>
+                <c:pt idx="5">
+                  <c:v>566240</c:v>
+                </c:pt>
+                <c:pt idx="6">
+                  <c:v>466896</c:v>
+                </c:pt>
+                <c:pt idx="7">
+                  <c:v>140560</c:v>
+                </c:pt>
+                <c:pt idx="8">
+                  <c:v>15601</c:v>
+                </c:pt>
+                <c:pt idx="9">
+                  <c:v>1349</c:v>
+                </c:pt>
+                <c:pt idx="10">
+                  <c:v>10</c:v>
+                </c:pt>
+              </c:numCache>
+            </c:numRef>
+          </c:val>
+        </c:ser>
+        <c:gapWidth val="0"/>
+        <c:axId val="4000"/>
+        <c:axId val="16713"/>
+      </c:barChart>
+      <c:catAx>
+        <c:axId val="4000"/>
+        <c:scaling>
+          <c:orientation val="minMax"/>
+        </c:scaling>
+        <c:delete val="0"/>
+        <c:axPos val="b"/>
+        <c:title>
+          <c:tx>
+            <c:rich>
+              <a:bodyPr/>
+              <a:lstStyle/>
+              <a:p>
+                <a:pPr>
+                  <a:defRPr/>
+                </a:pPr>
+                <a:r>
+                  <a:rPr b="1" sz="1000">
+                    <a:solidFill>
+                      <a:srgbClr val="000000"/>
+                    </a:solidFill>
+                    <a:latin typeface="Times New Roman"/>
+                    <a:ea typeface="ＭＳ Ｐゴシック"/>
+                  </a:rPr>
+                  <a:t>Number of views</a:t>
+                </a:r>
+              </a:p>
+            </c:rich>
+          </c:tx>
+          <c:layout/>
+        </c:title>
+        <c:majorTickMark val="out"/>
+        <c:minorTickMark val="none"/>
+        <c:tickLblPos val="nextTo"/>
+        <c:spPr>
+          <a:ln w="9360">
+            <a:solidFill>
+              <a:srgbClr val="878787"/>
+            </a:solidFill>
+            <a:round/>
+          </a:ln>
+        </c:spPr>
+        <c:crossAx val="16713"/>
+        <c:crosses val="autoZero"/>
+        <c:auto val="1"/>
+        <c:lblAlgn val="ctr"/>
+        <c:lblOffset val="100"/>
+      </c:catAx>
+      <c:valAx>
+        <c:axId val="16713"/>
+        <c:scaling>
+          <c:orientation val="minMax"/>
+        </c:scaling>
+        <c:delete val="0"/>
+        <c:axPos val="l"/>
+        <c:title>
+          <c:tx>
+            <c:rich>
+              <a:bodyPr/>
+              <a:lstStyle/>
+              <a:p>
+                <a:pPr>
+                  <a:defRPr/>
+                </a:pPr>
+                <a:r>
+                  <a:rPr b="1" sz="1000">
+                    <a:solidFill>
+                      <a:srgbClr val="000000"/>
+                    </a:solidFill>
+                    <a:latin typeface="Times New Roman"/>
+                    <a:ea typeface="ＭＳ Ｐゴシック"/>
+                  </a:rPr>
+                  <a:t>Number of videos</a:t>
+                </a:r>
+              </a:p>
+            </c:rich>
+          </c:tx>
+          <c:layout/>
+        </c:title>
+        <c:majorTickMark val="out"/>
+        <c:minorTickMark val="none"/>
+        <c:tickLblPos val="nextTo"/>
+        <c:spPr>
+          <a:ln w="9360">
+            <a:solidFill>
+              <a:srgbClr val="878787"/>
+            </a:solidFill>
+            <a:round/>
+          </a:ln>
+        </c:spPr>
+        <c:crossAx val="4000"/>
+        <c:crossesAt val="0"/>
+      </c:valAx>
+      <c:spPr>
+        <a:noFill/>
+        <a:ln w="25560">
+          <a:noFill/>
+        </a:ln>
+      </c:spPr>
+    </c:plotArea>
+    <c:plotVisOnly val="1"/>
+  </c:chart>
+  <c:spPr>
+    <a:noFill/>
+    <a:ln>
+      <a:solidFill>
+        <a:srgbClr val="000000"/>
+      </a:solidFill>
+    </a:ln>
+  </c:spPr>
+</c:chartSpace>
+</file>
+
+<file path=ppt/charts/chart6.xml><?xml version="1.0" encoding="utf-8"?>
+<c:chartSpace xmlns:c="http://schemas.openxmlformats.org/drawingml/2006/chart" xmlns:a="http://schemas.openxmlformats.org/drawingml/2006/main" xmlns:r="http://schemas.openxmlformats.org/officeDocument/2006/relationships">
+  <c:lang val="en-US"/>
+  <c:chart>
+    <c:title>
+      <c:tx>
+        <c:rich>
+          <a:bodyPr/>
+          <a:lstStyle/>
+          <a:p>
+            <a:pPr>
+              <a:defRPr/>
+            </a:pPr>
+            <a:r>
+              <a:rPr b="1">
+                <a:solidFill>
+                  <a:srgbClr val="000000"/>
+                </a:solidFill>
+                <a:latin typeface="Times New Roman"/>
+                <a:ea typeface="ＭＳ Ｐゴシック"/>
+              </a:rPr>
+              <a:t>Distribution of uploaders over no of uploaded videos</a:t>
+            </a:r>
+          </a:p>
+        </c:rich>
+      </c:tx>
+      <c:layout/>
+    </c:title>
+    <c:plotArea>
+      <c:layout/>
+      <c:barChart>
+        <c:barDir val="col"/>
+        <c:grouping val="clustered"/>
+        <c:ser>
+          <c:idx val="0"/>
+          <c:order val="0"/>
+          <c:tx>
+            <c:strRef>
+              <c:f>label 3</c:f>
+              <c:strCache>
+                <c:ptCount val="1"/>
+                <c:pt idx="0">
+                  <c:v>Number of users</c:v>
+                </c:pt>
+              </c:strCache>
+            </c:strRef>
+          </c:tx>
+          <c:spPr>
+            <a:solidFill>
+              <a:srgbClr val="4f81bd"/>
+            </a:solidFill>
+            <a:ln>
+              <a:noFill/>
+            </a:ln>
+          </c:spPr>
+          <c:cat>
+            <c:strRef>
+              <c:f>categories</c:f>
+              <c:strCache>
+                <c:ptCount val="10"/>
+                <c:pt idx="0">
+                  <c:v>158</c:v>
+                </c:pt>
+                <c:pt idx="1">
+                  <c:v>472</c:v>
+                </c:pt>
+                <c:pt idx="2">
+                  <c:v>786</c:v>
+                </c:pt>
+                <c:pt idx="3">
+                  <c:v>1099</c:v>
+                </c:pt>
+                <c:pt idx="4">
+                  <c:v>1413</c:v>
+                </c:pt>
+                <c:pt idx="5">
+                  <c:v>1727</c:v>
+                </c:pt>
+                <c:pt idx="6">
+                  <c:v>2041</c:v>
+                </c:pt>
+                <c:pt idx="7">
+                  <c:v>2355</c:v>
+                </c:pt>
+                <c:pt idx="8">
+                  <c:v>2668</c:v>
+                </c:pt>
+                <c:pt idx="9">
+                  <c:v>2982</c:v>
+                </c:pt>
+              </c:strCache>
+            </c:strRef>
+          </c:cat>
+          <c:val>
+            <c:numRef>
+              <c:f>3</c:f>
+              <c:numCache>
+                <c:formatCode>General</c:formatCode>
+                <c:ptCount val="10"/>
+                <c:pt idx="0">
+                  <c:v>627973</c:v>
+                </c:pt>
+                <c:pt idx="1">
+                  <c:v>65</c:v>
+                </c:pt>
+                <c:pt idx="2">
+                  <c:v>16</c:v>
+                </c:pt>
+                <c:pt idx="3">
+                  <c:v>9</c:v>
+                </c:pt>
+                <c:pt idx="4">
+                  <c:v>3</c:v>
+                </c:pt>
+                <c:pt idx="5">
+                  <c:v>2</c:v>
+                </c:pt>
+                <c:pt idx="6">
+                  <c:v>0</c:v>
+                </c:pt>
+                <c:pt idx="7">
+                  <c:v>1</c:v>
+                </c:pt>
+                <c:pt idx="8">
+                  <c:v>1</c:v>
+                </c:pt>
+                <c:pt idx="9">
+                  <c:v>2</c:v>
+                </c:pt>
+              </c:numCache>
+            </c:numRef>
+          </c:val>
+        </c:ser>
+        <c:gapWidth val="0"/>
+        <c:axId val="20868"/>
+        <c:axId val="16415"/>
+      </c:barChart>
+      <c:catAx>
+        <c:axId val="20868"/>
+        <c:scaling>
+          <c:orientation val="minMax"/>
+        </c:scaling>
+        <c:delete val="0"/>
+        <c:axPos val="b"/>
+        <c:title>
+          <c:tx>
+            <c:rich>
+              <a:bodyPr/>
+              <a:lstStyle/>
+              <a:p>
+                <a:pPr>
+                  <a:defRPr/>
+                </a:pPr>
+                <a:r>
+                  <a:rPr b="1" sz="1000">
+                    <a:solidFill>
+                      <a:srgbClr val="000000"/>
+                    </a:solidFill>
+                    <a:latin typeface="Times New Roman"/>
+                    <a:ea typeface="ＭＳ Ｐゴシック"/>
+                  </a:rPr>
+                  <a:t>Number of uploaded videos</a:t>
+                </a:r>
+              </a:p>
+            </c:rich>
+          </c:tx>
+          <c:layout/>
+        </c:title>
+        <c:majorTickMark val="out"/>
+        <c:minorTickMark val="none"/>
+        <c:tickLblPos val="nextTo"/>
+        <c:spPr>
+          <a:ln w="9360">
+            <a:solidFill>
+              <a:srgbClr val="878787"/>
+            </a:solidFill>
+            <a:round/>
+          </a:ln>
+        </c:spPr>
+        <c:crossAx val="16415"/>
+        <c:crosses val="autoZero"/>
+        <c:auto val="1"/>
+        <c:lblAlgn val="ctr"/>
+        <c:lblOffset val="100"/>
+      </c:catAx>
+      <c:valAx>
+        <c:axId val="16415"/>
+        <c:scaling>
+          <c:orientation val="minMax"/>
+        </c:scaling>
+        <c:delete val="0"/>
+        <c:axPos val="l"/>
+        <c:title>
+          <c:tx>
+            <c:rich>
+              <a:bodyPr/>
+              <a:lstStyle/>
+              <a:p>
+                <a:pPr>
+                  <a:defRPr/>
+                </a:pPr>
+                <a:r>
+                  <a:rPr b="1" sz="1000">
+                    <a:solidFill>
+                      <a:srgbClr val="000000"/>
+                    </a:solidFill>
+                    <a:latin typeface="Times New Roman"/>
+                    <a:ea typeface="ＭＳ Ｐゴシック"/>
+                  </a:rPr>
+                  <a:t>Number of uploaders</a:t>
+                </a:r>
+              </a:p>
+            </c:rich>
+          </c:tx>
+          <c:layout/>
+        </c:title>
+        <c:majorTickMark val="out"/>
+        <c:minorTickMark val="none"/>
+        <c:tickLblPos val="nextTo"/>
+        <c:spPr>
+          <a:ln w="9360">
+            <a:solidFill>
+              <a:srgbClr val="878787"/>
+            </a:solidFill>
+            <a:round/>
+          </a:ln>
+        </c:spPr>
+        <c:crossAx val="20868"/>
+        <c:crossesAt val="0"/>
+      </c:valAx>
+      <c:spPr>
+        <a:noFill/>
+        <a:ln w="25560">
           <a:noFill/>
         </a:ln>
       </c:spPr>
@@ -6433,7 +6433,7 @@
           <a:bodyPr lIns="0" rIns="0" tIns="0" bIns="0" anchor="b"/>
           <a:p>
             <a:pPr algn="r"/>
-            <a:fld id="{1E0E4688-976B-4E17-BB11-488FD6B3D6EB}" type="slidenum">
+            <a:fld id="{53510B70-284D-4AF0-AE58-0978B409318E}" type="slidenum">
               <a:rPr lang="en-US" sz="1400">
                 <a:latin typeface="Times New Roman"/>
               </a:rPr>
@@ -6468,14 +6468,14 @@
       </p:grpSpPr>
       <p:sp>
         <p:nvSpPr>
-          <p:cNvPr id="90" name="CustomShape 1"/>
+          <p:cNvPr id="91" name="CustomShape 1"/>
           <p:cNvSpPr/>
           <p:nvPr/>
         </p:nvSpPr>
         <p:spPr>
           <a:xfrm>
             <a:off x="18135720" y="48563280"/>
-            <a:ext cx="13862520" cy="2510280"/>
+            <a:ext cx="13862160" cy="2509920"/>
           </a:xfrm>
           <a:prstGeom prst="rect">
             <a:avLst/>
@@ -6488,14 +6488,14 @@
       </p:sp>
       <p:sp>
         <p:nvSpPr>
-          <p:cNvPr id="91" name="CustomShape 2"/>
+          <p:cNvPr id="92" name="CustomShape 2"/>
           <p:cNvSpPr/>
           <p:nvPr/>
         </p:nvSpPr>
         <p:spPr>
           <a:xfrm>
             <a:off x="18135720" y="48563280"/>
-            <a:ext cx="13864320" cy="2512080"/>
+            <a:ext cx="13863960" cy="2511720"/>
           </a:xfrm>
           <a:prstGeom prst="rect">
             <a:avLst/>
@@ -6508,14 +6508,14 @@
       </p:sp>
       <p:sp>
         <p:nvSpPr>
-          <p:cNvPr id="92" name="CustomShape 3"/>
+          <p:cNvPr id="93" name="CustomShape 3"/>
           <p:cNvSpPr/>
           <p:nvPr/>
         </p:nvSpPr>
         <p:spPr>
           <a:xfrm>
             <a:off x="18135720" y="48563280"/>
-            <a:ext cx="13867200" cy="2514960"/>
+            <a:ext cx="13866840" cy="2514600"/>
           </a:xfrm>
           <a:prstGeom prst="rect">
             <a:avLst/>
@@ -6528,14 +6528,14 @@
       </p:sp>
       <p:sp>
         <p:nvSpPr>
-          <p:cNvPr id="93" name="CustomShape 4"/>
+          <p:cNvPr id="94" name="CustomShape 4"/>
           <p:cNvSpPr/>
           <p:nvPr/>
         </p:nvSpPr>
         <p:spPr>
           <a:xfrm>
             <a:off x="4267080" y="24273000"/>
-            <a:ext cx="23468400" cy="22995360"/>
+            <a:ext cx="23468040" cy="22995000"/>
           </a:xfrm>
           <a:prstGeom prst="rect">
             <a:avLst/>
@@ -7742,7 +7742,7 @@
         <p:spPr>
           <a:xfrm>
             <a:off x="2743200" y="24991920"/>
-            <a:ext cx="7619040" cy="1827720"/>
+            <a:ext cx="7618680" cy="1827360"/>
           </a:xfrm>
           <a:prstGeom prst="rect">
             <a:avLst/>
@@ -7762,7 +7762,7 @@
         <p:spPr>
           <a:xfrm>
             <a:off x="12496680" y="24991920"/>
-            <a:ext cx="11581200" cy="1827720"/>
+            <a:ext cx="11580840" cy="1827360"/>
           </a:xfrm>
           <a:prstGeom prst="rect">
             <a:avLst/>
@@ -7971,16 +7971,56 @@
           <a:chExt cx="0" cy="0"/>
         </a:xfrm>
       </p:grpSpPr>
+      <p:graphicFrame>
+        <p:nvGraphicFramePr>
+          <p:cNvPr id="43" name="Chart 44"/>
+          <p:cNvGraphicFramePr/>
+          <p:nvPr/>
+        </p:nvGraphicFramePr>
+        <p:xfrm>
+          <a:off x="12718800" y="14173200"/>
+          <a:ext cx="9269280" cy="5905440"/>
+        </p:xfrm>
+        <a:graphic>
+          <a:graphicData uri="http://schemas.openxmlformats.org/drawingml/2006/chart">
+            <c:chart xmlns:c="http://schemas.openxmlformats.org/drawingml/2006/chart" xmlns:r="http://schemas.openxmlformats.org/officeDocument/2006/relationships" r:id="rId1"/>
+          </a:graphicData>
+        </a:graphic>
+      </p:graphicFrame>
       <p:sp>
         <p:nvSpPr>
-          <p:cNvPr id="43" name="CustomShape 1"/>
+          <p:cNvPr id="44" name="CustomShape 1"/>
+          <p:cNvSpPr/>
+          <p:nvPr/>
+        </p:nvSpPr>
+        <p:spPr>
+          <a:xfrm>
+            <a:off x="15253920" y="19385280"/>
+            <a:ext cx="4754880" cy="548640"/>
+          </a:xfrm>
+          <a:prstGeom prst="rect">
+            <a:avLst/>
+          </a:prstGeom>
+          <a:solidFill>
+            <a:srgbClr val="ffffff"/>
+          </a:solidFill>
+          <a:ln>
+            <a:solidFill>
+              <a:srgbClr val="ffffff"/>
+            </a:solidFill>
+          </a:ln>
+        </p:spPr>
+      </p:sp>
+      <p:sp>
+        <p:nvSpPr>
+          <p:cNvPr id="45" name="CustomShape 2"/>
           <p:cNvSpPr/>
           <p:nvPr/>
         </p:nvSpPr>
         <p:spPr>
           <a:xfrm>
             <a:off x="5905440" y="608040"/>
-            <a:ext cx="24230520" cy="1522800"/>
+            <a:ext cx="24230160" cy="1522440"/>
           </a:xfrm>
           <a:prstGeom prst="rect">
             <a:avLst/>
@@ -8014,14 +8054,14 @@
       </p:sp>
       <p:sp>
         <p:nvSpPr>
-          <p:cNvPr id="44" name="CustomShape 2"/>
+          <p:cNvPr id="46" name="CustomShape 3"/>
           <p:cNvSpPr/>
           <p:nvPr/>
         </p:nvSpPr>
         <p:spPr>
           <a:xfrm>
             <a:off x="977760" y="3808440"/>
-            <a:ext cx="10133640" cy="13746600"/>
+            <a:ext cx="10133280" cy="13746240"/>
           </a:xfrm>
           <a:prstGeom prst="rect">
             <a:avLst/>
@@ -8037,14 +8077,14 @@
       </p:sp>
       <p:sp>
         <p:nvSpPr>
-          <p:cNvPr id="45" name="CustomShape 3"/>
+          <p:cNvPr id="47" name="CustomShape 4"/>
           <p:cNvSpPr/>
           <p:nvPr/>
         </p:nvSpPr>
         <p:spPr>
           <a:xfrm>
             <a:off x="933480" y="17865720"/>
-            <a:ext cx="10138320" cy="8833320"/>
+            <a:ext cx="10137960" cy="8832960"/>
           </a:xfrm>
           <a:prstGeom prst="rect">
             <a:avLst/>
@@ -8060,14 +8100,14 @@
       </p:sp>
       <p:sp>
         <p:nvSpPr>
-          <p:cNvPr id="46" name="CustomShape 4"/>
+          <p:cNvPr id="48" name="CustomShape 5"/>
           <p:cNvSpPr/>
           <p:nvPr/>
         </p:nvSpPr>
         <p:spPr>
           <a:xfrm>
             <a:off x="11353680" y="20078640"/>
-            <a:ext cx="11995560" cy="6621840"/>
+            <a:ext cx="11995200" cy="6621480"/>
           </a:xfrm>
           <a:prstGeom prst="rect">
             <a:avLst/>
@@ -8083,14 +8123,14 @@
       </p:sp>
       <p:sp>
         <p:nvSpPr>
-          <p:cNvPr id="47" name="CustomShape 5"/>
+          <p:cNvPr id="49" name="CustomShape 6"/>
           <p:cNvSpPr/>
           <p:nvPr/>
         </p:nvSpPr>
         <p:spPr>
           <a:xfrm>
             <a:off x="1676520" y="1719360"/>
-            <a:ext cx="32917320" cy="1464120"/>
+            <a:ext cx="32916960" cy="1463760"/>
           </a:xfrm>
           <a:prstGeom prst="rect">
             <a:avLst/>
@@ -8142,14 +8182,14 @@
       </p:sp>
       <p:sp>
         <p:nvSpPr>
-          <p:cNvPr id="48" name="CustomShape 6"/>
+          <p:cNvPr id="50" name="CustomShape 7"/>
           <p:cNvSpPr/>
           <p:nvPr/>
         </p:nvSpPr>
         <p:spPr>
           <a:xfrm>
             <a:off x="1968480" y="7008840"/>
-            <a:ext cx="2386440" cy="856080"/>
+            <a:ext cx="2386080" cy="855720"/>
           </a:xfrm>
           <a:prstGeom prst="rect">
             <a:avLst/>
@@ -8162,14 +8202,14 @@
       </p:sp>
       <p:sp>
         <p:nvSpPr>
-          <p:cNvPr id="49" name="CustomShape 7"/>
+          <p:cNvPr id="51" name="CustomShape 8"/>
           <p:cNvSpPr/>
           <p:nvPr/>
         </p:nvSpPr>
         <p:spPr>
           <a:xfrm>
             <a:off x="977760" y="3808440"/>
-            <a:ext cx="10108080" cy="945000"/>
+            <a:ext cx="10107720" cy="944640"/>
           </a:xfrm>
           <a:prstGeom prst="rect">
             <a:avLst/>
@@ -8203,14 +8243,14 @@
       </p:sp>
       <p:sp>
         <p:nvSpPr>
-          <p:cNvPr id="50" name="CustomShape 8"/>
+          <p:cNvPr id="52" name="CustomShape 9"/>
           <p:cNvSpPr/>
           <p:nvPr/>
         </p:nvSpPr>
         <p:spPr>
           <a:xfrm>
             <a:off x="2013120" y="16000560"/>
-            <a:ext cx="10666800" cy="2196000"/>
+            <a:ext cx="10666440" cy="2195640"/>
           </a:xfrm>
           <a:prstGeom prst="rect">
             <a:avLst/>
@@ -8223,14 +8263,14 @@
       </p:sp>
       <p:sp>
         <p:nvSpPr>
-          <p:cNvPr id="51" name="CustomShape 9"/>
+          <p:cNvPr id="53" name="CustomShape 10"/>
           <p:cNvSpPr/>
           <p:nvPr/>
         </p:nvSpPr>
         <p:spPr>
           <a:xfrm>
             <a:off x="923760" y="17865720"/>
-            <a:ext cx="10149480" cy="916200"/>
+            <a:ext cx="10149120" cy="915840"/>
           </a:xfrm>
           <a:prstGeom prst="rect">
             <a:avLst/>
@@ -8264,14 +8304,14 @@
       </p:sp>
       <p:sp>
         <p:nvSpPr>
-          <p:cNvPr id="52" name="CustomShape 10"/>
+          <p:cNvPr id="54" name="CustomShape 11"/>
           <p:cNvSpPr/>
           <p:nvPr/>
         </p:nvSpPr>
         <p:spPr>
           <a:xfrm>
             <a:off x="1006560" y="8028000"/>
-            <a:ext cx="9873000" cy="916200"/>
+            <a:ext cx="9872640" cy="915840"/>
           </a:xfrm>
           <a:prstGeom prst="rect">
             <a:avLst/>
@@ -8305,14 +8345,14 @@
       </p:sp>
       <p:sp>
         <p:nvSpPr>
-          <p:cNvPr id="53" name="CustomShape 11"/>
+          <p:cNvPr id="55" name="CustomShape 12"/>
           <p:cNvSpPr/>
           <p:nvPr/>
         </p:nvSpPr>
         <p:spPr>
           <a:xfrm>
             <a:off x="11531520" y="22097880"/>
-            <a:ext cx="10362240" cy="3310920"/>
+            <a:ext cx="10361880" cy="3310560"/>
           </a:xfrm>
           <a:prstGeom prst="rect">
             <a:avLst/>
@@ -8352,14 +8392,14 @@
       </p:sp>
       <p:sp>
         <p:nvSpPr>
-          <p:cNvPr id="54" name="CustomShape 12"/>
+          <p:cNvPr id="56" name="CustomShape 13"/>
           <p:cNvSpPr/>
           <p:nvPr/>
         </p:nvSpPr>
         <p:spPr>
           <a:xfrm>
             <a:off x="22072680" y="20269080"/>
-            <a:ext cx="697320" cy="835560"/>
+            <a:ext cx="696960" cy="835200"/>
           </a:xfrm>
           <a:prstGeom prst="rect">
             <a:avLst/>
@@ -8372,14 +8412,14 @@
       </p:sp>
       <p:sp>
         <p:nvSpPr>
-          <p:cNvPr id="55" name="CustomShape 13"/>
+          <p:cNvPr id="57" name="CustomShape 14"/>
           <p:cNvSpPr/>
           <p:nvPr/>
         </p:nvSpPr>
         <p:spPr>
           <a:xfrm>
             <a:off x="23671080" y="5030640"/>
-            <a:ext cx="11532240" cy="14262480"/>
+            <a:ext cx="11531880" cy="14262120"/>
           </a:xfrm>
           <a:prstGeom prst="rect">
             <a:avLst/>
@@ -8392,14 +8432,14 @@
       </p:sp>
       <p:sp>
         <p:nvSpPr>
-          <p:cNvPr id="56" name="CustomShape 14"/>
+          <p:cNvPr id="58" name="CustomShape 15"/>
           <p:cNvSpPr/>
           <p:nvPr/>
         </p:nvSpPr>
         <p:spPr>
           <a:xfrm>
             <a:off x="1300320" y="4538520"/>
-            <a:ext cx="9600120" cy="3415320"/>
+            <a:ext cx="9599760" cy="3414960"/>
           </a:xfrm>
           <a:prstGeom prst="rect">
             <a:avLst/>
@@ -8418,7 +8458,7 @@
               </a:lnSpc>
               <a:buSzPct val="60000"/>
               <a:buFont typeface="StarSymbol"/>
-              <a:buChar char="l"/>
+              <a:buChar char=""/>
             </a:pPr>
             <a:r>
               <a:rPr lang="en-US" sz="3200">
@@ -8439,7 +8479,7 @@
               </a:lnSpc>
               <a:buSzPct val="60000"/>
               <a:buFont typeface="StarSymbol"/>
-              <a:buChar char="l"/>
+              <a:buChar char=""/>
             </a:pPr>
             <a:r>
               <a:rPr lang="en-US" sz="3200">
@@ -8458,9 +8498,9 @@
               <a:lnSpc>
                 <a:spcPct val="100000"/>
               </a:lnSpc>
-              <a:buSzPct val="45000"/>
+              <a:buSzPct val="60000"/>
               <a:buFont typeface="StarSymbol"/>
-              <a:buChar char="l"/>
+              <a:buChar char=""/>
             </a:pPr>
             <a:r>
               <a:rPr lang="en-US" sz="3200">
@@ -8479,9 +8519,9 @@
               <a:lnSpc>
                 <a:spcPct val="100000"/>
               </a:lnSpc>
-              <a:buSzPct val="45000"/>
+              <a:buSzPct val="60000"/>
               <a:buFont typeface="StarSymbol"/>
-              <a:buChar char="l"/>
+              <a:buChar char=""/>
             </a:pPr>
             <a:r>
               <a:rPr lang="en-US" sz="3200">
@@ -8500,9 +8540,9 @@
               <a:lnSpc>
                 <a:spcPct val="100000"/>
               </a:lnSpc>
-              <a:buSzPct val="45000"/>
+              <a:buSzPct val="60000"/>
               <a:buFont typeface="StarSymbol"/>
-              <a:buChar char="l"/>
+              <a:buChar char=""/>
             </a:pPr>
             <a:r>
               <a:rPr lang="en-US" sz="3200">
@@ -8540,14 +8580,14 @@
       </p:sp>
       <p:sp>
         <p:nvSpPr>
-          <p:cNvPr id="57" name="CustomShape 15"/>
+          <p:cNvPr id="59" name="CustomShape 16"/>
           <p:cNvSpPr/>
           <p:nvPr/>
         </p:nvSpPr>
         <p:spPr>
           <a:xfrm>
             <a:off x="23752080" y="20097720"/>
-            <a:ext cx="11816280" cy="916200"/>
+            <a:ext cx="11815920" cy="915840"/>
           </a:xfrm>
           <a:prstGeom prst="rect">
             <a:avLst/>
@@ -8581,14 +8621,14 @@
       </p:sp>
       <p:sp>
         <p:nvSpPr>
-          <p:cNvPr id="58" name="CustomShape 16"/>
+          <p:cNvPr id="60" name="CustomShape 17"/>
           <p:cNvSpPr/>
           <p:nvPr/>
         </p:nvSpPr>
         <p:spPr>
           <a:xfrm>
             <a:off x="23752080" y="20097720"/>
-            <a:ext cx="11816280" cy="6601320"/>
+            <a:ext cx="11815920" cy="6600960"/>
           </a:xfrm>
           <a:prstGeom prst="rect">
             <a:avLst/>
@@ -8604,14 +8644,14 @@
       </p:sp>
       <p:sp>
         <p:nvSpPr>
-          <p:cNvPr id="59" name="CustomShape 17"/>
+          <p:cNvPr id="61" name="CustomShape 18"/>
           <p:cNvSpPr/>
           <p:nvPr/>
         </p:nvSpPr>
         <p:spPr>
           <a:xfrm>
             <a:off x="1366920" y="8785080"/>
-            <a:ext cx="9325440" cy="4785120"/>
+            <a:ext cx="9325080" cy="4784760"/>
           </a:xfrm>
           <a:prstGeom prst="rect">
             <a:avLst/>
@@ -8630,7 +8670,7 @@
               </a:lnSpc>
               <a:buSzPct val="60000"/>
               <a:buFont typeface="StarSymbol"/>
-              <a:buChar char="l"/>
+              <a:buChar char=""/>
             </a:pPr>
             <a:r>
               <a:rPr lang="en-US" sz="3200">
@@ -8651,7 +8691,7 @@
               </a:lnSpc>
               <a:buSzPct val="60000"/>
               <a:buFont typeface="StarSymbol"/>
-              <a:buChar char="l"/>
+              <a:buChar char=""/>
             </a:pPr>
             <a:r>
               <a:rPr lang="en-US" sz="3200">
@@ -8672,7 +8712,7 @@
               </a:lnSpc>
               <a:buSzPct val="60000"/>
               <a:buFont typeface="StarSymbol"/>
-              <a:buChar char="l"/>
+              <a:buChar char=""/>
             </a:pPr>
             <a:r>
               <a:rPr lang="en-US" sz="3200">
@@ -8706,12 +8746,12 @@
       </p:sp>
       <p:pic>
         <p:nvPicPr>
-          <p:cNvPr id="60" name="Picture 26" descr=""/>
+          <p:cNvPr id="62" name="Picture 26" descr=""/>
           <p:cNvPicPr/>
           <p:nvPr/>
         </p:nvPicPr>
         <p:blipFill>
-          <a:blip r:embed="rId1"/>
+          <a:blip r:embed="rId2"/>
           <a:stretch>
             <a:fillRect/>
           </a:stretch>
@@ -8719,7 +8759,7 @@
         <p:spPr>
           <a:xfrm>
             <a:off x="1366920" y="11808000"/>
-            <a:ext cx="9358920" cy="5328000"/>
+            <a:ext cx="9358560" cy="5327640"/>
           </a:xfrm>
           <a:prstGeom prst="rect">
             <a:avLst/>
@@ -8734,14 +8774,14 @@
       </p:pic>
       <p:sp>
         <p:nvSpPr>
-          <p:cNvPr id="61" name="CustomShape 18"/>
+          <p:cNvPr id="63" name="CustomShape 19"/>
           <p:cNvSpPr/>
           <p:nvPr/>
         </p:nvSpPr>
         <p:spPr>
           <a:xfrm>
             <a:off x="23671080" y="4784760"/>
-            <a:ext cx="11951280" cy="916200"/>
+            <a:ext cx="11950920" cy="915840"/>
           </a:xfrm>
           <a:prstGeom prst="rect">
             <a:avLst/>
@@ -8775,14 +8815,14 @@
       </p:sp>
       <p:sp>
         <p:nvSpPr>
-          <p:cNvPr id="62" name="CustomShape 19"/>
+          <p:cNvPr id="64" name="CustomShape 20"/>
           <p:cNvSpPr/>
           <p:nvPr/>
         </p:nvSpPr>
         <p:spPr>
           <a:xfrm>
             <a:off x="11979360" y="5030640"/>
-            <a:ext cx="11417760" cy="14262480"/>
+            <a:ext cx="11417400" cy="14262120"/>
           </a:xfrm>
           <a:prstGeom prst="rect">
             <a:avLst/>
@@ -8795,14 +8835,14 @@
       </p:sp>
       <p:sp>
         <p:nvSpPr>
-          <p:cNvPr id="63" name="CustomShape 20"/>
+          <p:cNvPr id="65" name="CustomShape 21"/>
           <p:cNvSpPr/>
           <p:nvPr/>
         </p:nvSpPr>
         <p:spPr>
           <a:xfrm>
             <a:off x="11950560" y="4784760"/>
-            <a:ext cx="11449440" cy="916200"/>
+            <a:ext cx="11449080" cy="915840"/>
           </a:xfrm>
           <a:prstGeom prst="rect">
             <a:avLst/>
@@ -8836,14 +8876,14 @@
       </p:sp>
       <p:sp>
         <p:nvSpPr>
-          <p:cNvPr id="64" name="CustomShape 21"/>
+          <p:cNvPr id="66" name="CustomShape 22"/>
           <p:cNvSpPr/>
           <p:nvPr/>
         </p:nvSpPr>
         <p:spPr>
           <a:xfrm>
             <a:off x="11376000" y="20123280"/>
-            <a:ext cx="12005280" cy="916200"/>
+            <a:ext cx="12004920" cy="915840"/>
           </a:xfrm>
           <a:prstGeom prst="rect">
             <a:avLst/>
@@ -8877,14 +8917,14 @@
       </p:sp>
       <p:sp>
         <p:nvSpPr>
-          <p:cNvPr id="65" name="CustomShape 22"/>
+          <p:cNvPr id="67" name="CustomShape 23"/>
           <p:cNvSpPr/>
           <p:nvPr/>
         </p:nvSpPr>
         <p:spPr>
           <a:xfrm>
             <a:off x="18653040" y="3902040"/>
-            <a:ext cx="9417600" cy="819720"/>
+            <a:ext cx="9417240" cy="819360"/>
           </a:xfrm>
           <a:prstGeom prst="rect">
             <a:avLst/>
@@ -8918,14 +8958,14 @@
       </p:sp>
       <p:sp>
         <p:nvSpPr>
-          <p:cNvPr id="66" name="CustomShape 23"/>
+          <p:cNvPr id="68" name="CustomShape 24"/>
           <p:cNvSpPr/>
           <p:nvPr/>
         </p:nvSpPr>
         <p:spPr>
           <a:xfrm>
             <a:off x="11353680" y="3808440"/>
-            <a:ext cx="24306840" cy="15850080"/>
+            <a:ext cx="24306480" cy="15849720"/>
           </a:xfrm>
           <a:prstGeom prst="rect">
             <a:avLst/>
@@ -8941,14 +8981,14 @@
       </p:sp>
       <p:sp>
         <p:nvSpPr>
-          <p:cNvPr id="67" name="CustomShape 24"/>
+          <p:cNvPr id="69" name="CustomShape 25"/>
           <p:cNvSpPr/>
           <p:nvPr/>
         </p:nvSpPr>
         <p:spPr>
           <a:xfrm>
             <a:off x="933480" y="18612000"/>
-            <a:ext cx="9947880" cy="2520000"/>
+            <a:ext cx="9947520" cy="2519640"/>
           </a:xfrm>
           <a:prstGeom prst="rect">
             <a:avLst/>
@@ -8965,8 +9005,8 @@
               <a:lnSpc>
                 <a:spcPct val="100000"/>
               </a:lnSpc>
-              <a:buSzPct val="45000"/>
-              <a:buFont typeface="Wingdings" charset="2"/>
+              <a:buSzPct val="60000"/>
+              <a:buFont typeface="StarSymbol"/>
               <a:buChar char=""/>
             </a:pPr>
             <a:r>
@@ -8986,9 +9026,9 @@
               <a:lnSpc>
                 <a:spcPct val="100000"/>
               </a:lnSpc>
-              <a:buSzPct val="45000"/>
+              <a:buSzPct val="60000"/>
               <a:buFont typeface="StarSymbol"/>
-              <a:buChar char="l"/>
+              <a:buChar char=""/>
             </a:pPr>
             <a:r>
               <a:rPr lang="en-US" sz="3200">
@@ -9007,9 +9047,9 @@
               <a:lnSpc>
                 <a:spcPct val="100000"/>
               </a:lnSpc>
-              <a:buSzPct val="45000"/>
+              <a:buSzPct val="60000"/>
               <a:buFont typeface="StarSymbol"/>
-              <a:buChar char="l"/>
+              <a:buChar char=""/>
             </a:pPr>
             <a:r>
               <a:rPr lang="en-US" sz="3200">
@@ -9028,8 +9068,9 @@
               <a:lnSpc>
                 <a:spcPct val="100000"/>
               </a:lnSpc>
-              <a:buFont typeface="Arial"/>
-              <a:buChar char="•"/>
+              <a:buSzPct val="60000"/>
+              <a:buFont typeface="StarSymbol"/>
+              <a:buChar char=""/>
             </a:pPr>
             <a:r>
               <a:rPr lang="en-US" sz="3200">
@@ -9055,14 +9096,14 @@
       </p:sp>
       <p:sp>
         <p:nvSpPr>
-          <p:cNvPr id="68" name="CustomShape 25"/>
+          <p:cNvPr id="70" name="CustomShape 26"/>
           <p:cNvSpPr/>
           <p:nvPr/>
         </p:nvSpPr>
         <p:spPr>
           <a:xfrm>
             <a:off x="11518920" y="20976480"/>
-            <a:ext cx="11089080" cy="5665320"/>
+            <a:ext cx="11088720" cy="5664960"/>
           </a:xfrm>
           <a:prstGeom prst="rect">
             <a:avLst/>
@@ -9099,7 +9140,7 @@
               </a:lnSpc>
               <a:buSzPct val="60000"/>
               <a:buFont typeface="StarSymbol"/>
-              <a:buChar char="l"/>
+              <a:buChar char=""/>
             </a:pPr>
             <a:r>
               <a:rPr lang="en-US" sz="3200">
@@ -9118,9 +9159,9 @@
               <a:lnSpc>
                 <a:spcPct val="100000"/>
               </a:lnSpc>
-              <a:buSzPct val="45000"/>
+              <a:buSzPct val="60000"/>
               <a:buFont typeface="StarSymbol"/>
-              <a:buChar char="l"/>
+              <a:buChar char=""/>
             </a:pPr>
             <a:r>
               <a:rPr lang="en-US" sz="3200">
@@ -9139,9 +9180,9 @@
               <a:lnSpc>
                 <a:spcPct val="100000"/>
               </a:lnSpc>
-              <a:buSzPct val="45000"/>
+              <a:buSzPct val="60000"/>
               <a:buFont typeface="StarSymbol"/>
-              <a:buChar char="l"/>
+              <a:buChar char=""/>
             </a:pPr>
             <a:r>
               <a:rPr lang="en-US" sz="3200">
@@ -9160,9 +9201,9 @@
               <a:lnSpc>
                 <a:spcPct val="100000"/>
               </a:lnSpc>
-              <a:buSzPct val="45000"/>
+              <a:buSzPct val="60000"/>
               <a:buFont typeface="StarSymbol"/>
-              <a:buChar char="l"/>
+              <a:buChar char=""/>
             </a:pPr>
             <a:r>
               <a:rPr lang="en-US" sz="3200">
@@ -9181,9 +9222,9 @@
               <a:lnSpc>
                 <a:spcPct val="100000"/>
               </a:lnSpc>
-              <a:buSzPct val="45000"/>
+              <a:buSzPct val="60000"/>
               <a:buFont typeface="StarSymbol"/>
-              <a:buChar char="l"/>
+              <a:buChar char=""/>
             </a:pPr>
             <a:r>
               <a:rPr lang="en-US" sz="3200">
@@ -9202,9 +9243,9 @@
               <a:lnSpc>
                 <a:spcPct val="100000"/>
               </a:lnSpc>
-              <a:buSzPct val="45000"/>
+              <a:buSzPct val="60000"/>
               <a:buFont typeface="StarSymbol"/>
-              <a:buChar char="l"/>
+              <a:buChar char=""/>
             </a:pPr>
             <a:r>
               <a:rPr lang="en-US" sz="3200">
@@ -9223,9 +9264,9 @@
               <a:lnSpc>
                 <a:spcPct val="100000"/>
               </a:lnSpc>
-              <a:buSzPct val="45000"/>
+              <a:buSzPct val="60000"/>
               <a:buFont typeface="StarSymbol"/>
-              <a:buChar char="l"/>
+              <a:buChar char=""/>
             </a:pPr>
             <a:r>
               <a:rPr lang="en-US" sz="3200">
@@ -9246,7 +9287,7 @@
               </a:lnSpc>
               <a:buSzPct val="60000"/>
               <a:buFont typeface="StarSymbol"/>
-              <a:buChar char="l"/>
+              <a:buChar char=""/>
             </a:pPr>
             <a:r>
               <a:rPr lang="en-US" sz="3200">
@@ -9265,9 +9306,9 @@
               <a:lnSpc>
                 <a:spcPct val="100000"/>
               </a:lnSpc>
-              <a:buSzPct val="45000"/>
+              <a:buSzPct val="60000"/>
               <a:buFont typeface="StarSymbol"/>
-              <a:buChar char="l"/>
+              <a:buChar char=""/>
             </a:pPr>
             <a:r>
               <a:rPr lang="en-US" sz="3200">
@@ -9286,9 +9327,9 @@
               <a:lnSpc>
                 <a:spcPct val="100000"/>
               </a:lnSpc>
-              <a:buSzPct val="45000"/>
+              <a:buSzPct val="60000"/>
               <a:buFont typeface="StarSymbol"/>
-              <a:buChar char="l"/>
+              <a:buChar char=""/>
             </a:pPr>
             <a:r>
               <a:rPr lang="en-US" sz="3200">
@@ -9306,29 +9347,13 @@
       </p:sp>
       <p:graphicFrame>
         <p:nvGraphicFramePr>
-          <p:cNvPr id="69" name="Chart 45"/>
+          <p:cNvPr id="71" name="Chart 45"/>
           <p:cNvGraphicFramePr/>
           <p:nvPr/>
         </p:nvGraphicFramePr>
         <p:xfrm>
           <a:off x="1294200" y="21348720"/>
-          <a:ext cx="4463280" cy="5002560"/>
-        </p:xfrm>
-        <a:graphic>
-          <a:graphicData uri="http://schemas.openxmlformats.org/drawingml/2006/chart">
-            <c:chart xmlns:c="http://schemas.openxmlformats.org/drawingml/2006/chart" xmlns:r="http://schemas.openxmlformats.org/officeDocument/2006/relationships" r:id="rId2"/>
-          </a:graphicData>
-        </a:graphic>
-      </p:graphicFrame>
-      <p:graphicFrame>
-        <p:nvGraphicFramePr>
-          <p:cNvPr id="70" name="Chart 49"/>
-          <p:cNvGraphicFramePr/>
-          <p:nvPr/>
-        </p:nvGraphicFramePr>
-        <p:xfrm>
-          <a:off x="5974560" y="21276720"/>
-          <a:ext cx="4751280" cy="4998240"/>
+          <a:ext cx="4462920" cy="5002200"/>
         </p:xfrm>
         <a:graphic>
           <a:graphicData uri="http://schemas.openxmlformats.org/drawingml/2006/chart">
@@ -9336,9 +9361,25 @@
           </a:graphicData>
         </a:graphic>
       </p:graphicFrame>
+      <p:graphicFrame>
+        <p:nvGraphicFramePr>
+          <p:cNvPr id="72" name="Chart 49"/>
+          <p:cNvGraphicFramePr/>
+          <p:nvPr/>
+        </p:nvGraphicFramePr>
+        <p:xfrm>
+          <a:off x="5974560" y="21380400"/>
+          <a:ext cx="4750920" cy="4680000"/>
+        </p:xfrm>
+        <a:graphic>
+          <a:graphicData uri="http://schemas.openxmlformats.org/drawingml/2006/chart">
+            <c:chart xmlns:c="http://schemas.openxmlformats.org/drawingml/2006/chart" xmlns:r="http://schemas.openxmlformats.org/officeDocument/2006/relationships" r:id="rId4"/>
+          </a:graphicData>
+        </a:graphic>
+      </p:graphicFrame>
       <p:sp>
         <p:nvSpPr>
-          <p:cNvPr id="71" name="Line 26"/>
+          <p:cNvPr id="73" name="Line 27"/>
           <p:cNvSpPr/>
           <p:nvPr/>
         </p:nvSpPr>
@@ -9360,14 +9401,14 @@
       </p:sp>
       <p:sp>
         <p:nvSpPr>
-          <p:cNvPr id="72" name="CustomShape 27"/>
+          <p:cNvPr id="74" name="CustomShape 28"/>
           <p:cNvSpPr/>
           <p:nvPr/>
         </p:nvSpPr>
         <p:spPr>
           <a:xfrm>
             <a:off x="23752080" y="21015360"/>
-            <a:ext cx="11816280" cy="5683680"/>
+            <a:ext cx="11815920" cy="5683320"/>
           </a:xfrm>
           <a:prstGeom prst="rect">
             <a:avLst/>
@@ -9386,7 +9427,7 @@
               </a:lnSpc>
               <a:buSzPct val="60000"/>
               <a:buFont typeface="StarSymbol"/>
-              <a:buChar char="l"/>
+              <a:buChar char=""/>
             </a:pPr>
             <a:r>
               <a:rPr lang="en-US" sz="3200">
@@ -9407,7 +9448,7 @@
               </a:lnSpc>
               <a:buSzPct val="60000"/>
               <a:buFont typeface="StarSymbol"/>
-              <a:buChar char="l"/>
+              <a:buChar char=""/>
             </a:pPr>
             <a:r>
               <a:rPr lang="en-US" sz="3200">
@@ -9436,7 +9477,7 @@
               </a:lnSpc>
               <a:buSzPct val="60000"/>
               <a:buFont typeface="StarSymbol"/>
-              <a:buChar char="l"/>
+              <a:buChar char=""/>
             </a:pPr>
             <a:r>
               <a:rPr lang="en-US" sz="3200">
@@ -9457,7 +9498,7 @@
               </a:lnSpc>
               <a:buSzPct val="60000"/>
               <a:buFont typeface="StarSymbol"/>
-              <a:buChar char="l"/>
+              <a:buChar char=""/>
             </a:pPr>
             <a:r>
               <a:rPr lang="en-US" sz="3200">
@@ -9486,7 +9527,7 @@
               </a:lnSpc>
               <a:buSzPct val="60000"/>
               <a:buFont typeface="StarSymbol"/>
-              <a:buChar char="l"/>
+              <a:buChar char=""/>
             </a:pPr>
             <a:r>
               <a:rPr lang="en-US" sz="3200">
@@ -9507,7 +9548,7 @@
               </a:lnSpc>
               <a:buSzPct val="60000"/>
               <a:buFont typeface="StarSymbol"/>
-              <a:buChar char="l"/>
+              <a:buChar char=""/>
             </a:pPr>
             <a:r>
               <a:rPr lang="en-US" sz="3200">
@@ -9536,7 +9577,7 @@
               </a:lnSpc>
               <a:buSzPct val="60000"/>
               <a:buFont typeface="StarSymbol"/>
-              <a:buChar char="l"/>
+              <a:buChar char=""/>
             </a:pPr>
             <a:r>
               <a:rPr lang="en-US" sz="3200">
@@ -9576,32 +9617,16 @@
           </a:p>
         </p:txBody>
       </p:sp>
-      <p:graphicFrame>
-        <p:nvGraphicFramePr>
-          <p:cNvPr id="73" name="Chart 44"/>
-          <p:cNvGraphicFramePr/>
-          <p:nvPr/>
-        </p:nvGraphicFramePr>
-        <p:xfrm>
-          <a:off x="12718800" y="14173200"/>
-          <a:ext cx="9269640" cy="5241240"/>
-        </p:xfrm>
-        <a:graphic>
-          <a:graphicData uri="http://schemas.openxmlformats.org/drawingml/2006/chart">
-            <c:chart xmlns:c="http://schemas.openxmlformats.org/drawingml/2006/chart" xmlns:r="http://schemas.openxmlformats.org/officeDocument/2006/relationships" r:id="rId4"/>
-          </a:graphicData>
-        </a:graphic>
-      </p:graphicFrame>
       <p:sp>
         <p:nvSpPr>
-          <p:cNvPr id="74" name="CustomShape 28"/>
+          <p:cNvPr id="75" name="CustomShape 29"/>
           <p:cNvSpPr/>
           <p:nvPr/>
         </p:nvSpPr>
         <p:spPr>
           <a:xfrm>
             <a:off x="25068600" y="9231480"/>
-            <a:ext cx="5624640" cy="583560"/>
+            <a:ext cx="5624280" cy="583200"/>
           </a:xfrm>
           <a:prstGeom prst="rect">
             <a:avLst/>
@@ -9614,7 +9639,7 @@
       </p:sp>
       <p:pic>
         <p:nvPicPr>
-          <p:cNvPr id="75" name="" descr=""/>
+          <p:cNvPr id="76" name="" descr=""/>
           <p:cNvPicPr/>
           <p:nvPr/>
         </p:nvPicPr>
@@ -9627,7 +9652,7 @@
         <p:spPr>
           <a:xfrm>
             <a:off x="24377040" y="15364080"/>
-            <a:ext cx="5140800" cy="3042000"/>
+            <a:ext cx="5140440" cy="3041640"/>
           </a:xfrm>
           <a:prstGeom prst="rect">
             <a:avLst/>
@@ -9639,7 +9664,7 @@
       </p:pic>
       <p:pic>
         <p:nvPicPr>
-          <p:cNvPr id="76" name="" descr=""/>
+          <p:cNvPr id="77" name="" descr=""/>
           <p:cNvPicPr/>
           <p:nvPr/>
         </p:nvPicPr>
@@ -9652,7 +9677,7 @@
         <p:spPr>
           <a:xfrm>
             <a:off x="29449440" y="15389280"/>
-            <a:ext cx="5418000" cy="3016800"/>
+            <a:ext cx="5417640" cy="3016440"/>
           </a:xfrm>
           <a:prstGeom prst="rect">
             <a:avLst/>
@@ -9664,14 +9689,14 @@
       </p:pic>
       <p:sp>
         <p:nvSpPr>
-          <p:cNvPr id="77" name="CustomShape 29"/>
+          <p:cNvPr id="78" name="CustomShape 30"/>
           <p:cNvSpPr/>
           <p:nvPr/>
         </p:nvSpPr>
         <p:spPr>
           <a:xfrm>
             <a:off x="24525360" y="14874480"/>
-            <a:ext cx="10149120" cy="458640"/>
+            <a:ext cx="10148760" cy="458280"/>
           </a:xfrm>
           <a:prstGeom prst="rect">
             <a:avLst/>
@@ -9701,14 +9726,14 @@
       </p:sp>
       <p:sp>
         <p:nvSpPr>
-          <p:cNvPr id="78" name="CustomShape 30"/>
+          <p:cNvPr id="79" name="CustomShape 31"/>
           <p:cNvSpPr/>
           <p:nvPr/>
         </p:nvSpPr>
         <p:spPr>
           <a:xfrm>
             <a:off x="25256880" y="18377280"/>
-            <a:ext cx="3382560" cy="486000"/>
+            <a:ext cx="3382200" cy="485640"/>
           </a:xfrm>
           <a:prstGeom prst="rect">
             <a:avLst/>
@@ -9738,14 +9763,14 @@
       </p:sp>
       <p:sp>
         <p:nvSpPr>
-          <p:cNvPr id="79" name="CustomShape 31"/>
+          <p:cNvPr id="80" name="CustomShape 32"/>
           <p:cNvSpPr/>
           <p:nvPr/>
         </p:nvSpPr>
         <p:spPr>
           <a:xfrm>
             <a:off x="30743280" y="18324720"/>
-            <a:ext cx="3382560" cy="486000"/>
+            <a:ext cx="3382200" cy="485640"/>
           </a:xfrm>
           <a:prstGeom prst="rect">
             <a:avLst/>
@@ -9775,14 +9800,14 @@
       </p:sp>
       <p:sp>
         <p:nvSpPr>
-          <p:cNvPr id="80" name="CustomShape 32"/>
+          <p:cNvPr id="81" name="CustomShape 33"/>
           <p:cNvSpPr/>
           <p:nvPr/>
         </p:nvSpPr>
         <p:spPr>
           <a:xfrm>
             <a:off x="23957280" y="5943600"/>
-            <a:ext cx="11246400" cy="8930520"/>
+            <a:ext cx="11246040" cy="8930160"/>
           </a:xfrm>
           <a:prstGeom prst="rect">
             <a:avLst/>
@@ -9850,9 +9875,9 @@
               <a:lnSpc>
                 <a:spcPct val="100000"/>
               </a:lnSpc>
-              <a:buSzPct val="45000"/>
+              <a:buSzPct val="60000"/>
               <a:buFont typeface="StarSymbol"/>
-              <a:buChar char="l"/>
+              <a:buChar char=""/>
             </a:pPr>
             <a:r>
               <a:rPr lang="en-US" sz="2600">
@@ -9870,9 +9895,9 @@
               <a:lnSpc>
                 <a:spcPct val="100000"/>
               </a:lnSpc>
-              <a:buSzPct val="45000"/>
+              <a:buSzPct val="60000"/>
               <a:buFont typeface="StarSymbol"/>
-              <a:buChar char="l"/>
+              <a:buChar char=""/>
             </a:pPr>
             <a:r>
               <a:rPr lang="en-US" sz="2600">
@@ -9890,9 +9915,9 @@
               <a:lnSpc>
                 <a:spcPct val="100000"/>
               </a:lnSpc>
-              <a:buSzPct val="45000"/>
+              <a:buSzPct val="60000"/>
               <a:buFont typeface="StarSymbol"/>
-              <a:buChar char="l"/>
+              <a:buChar char=""/>
             </a:pPr>
             <a:r>
               <a:rPr lang="en-US" sz="2600">
@@ -9910,9 +9935,9 @@
               <a:lnSpc>
                 <a:spcPct val="100000"/>
               </a:lnSpc>
-              <a:buSzPct val="45000"/>
+              <a:buSzPct val="60000"/>
               <a:buFont typeface="StarSymbol"/>
-              <a:buChar char="l"/>
+              <a:buChar char=""/>
             </a:pPr>
             <a:r>
               <a:rPr lang="en-US" sz="2600">
@@ -9930,9 +9955,9 @@
               <a:lnSpc>
                 <a:spcPct val="100000"/>
               </a:lnSpc>
-              <a:buSzPct val="45000"/>
+              <a:buSzPct val="60000"/>
               <a:buFont typeface="StarSymbol"/>
-              <a:buChar char="l"/>
+              <a:buChar char=""/>
             </a:pPr>
             <a:r>
               <a:rPr lang="en-US" sz="2600">
@@ -9991,9 +10016,9 @@
               <a:lnSpc>
                 <a:spcPct val="100000"/>
               </a:lnSpc>
-              <a:buSzPct val="45000"/>
+              <a:buSzPct val="60000"/>
               <a:buFont typeface="StarSymbol"/>
-              <a:buChar char="l"/>
+              <a:buChar char=""/>
             </a:pPr>
             <a:r>
               <a:rPr lang="en-US" sz="2600">
@@ -10011,9 +10036,9 @@
               <a:lnSpc>
                 <a:spcPct val="100000"/>
               </a:lnSpc>
-              <a:buSzPct val="45000"/>
+              <a:buSzPct val="60000"/>
               <a:buFont typeface="StarSymbol"/>
-              <a:buChar char="l"/>
+              <a:buChar char=""/>
             </a:pPr>
             <a:r>
               <a:rPr lang="en-US" sz="2600">
@@ -10031,9 +10056,9 @@
               <a:lnSpc>
                 <a:spcPct val="100000"/>
               </a:lnSpc>
-              <a:buSzPct val="45000"/>
+              <a:buSzPct val="60000"/>
               <a:buFont typeface="StarSymbol"/>
-              <a:buChar char="l"/>
+              <a:buChar char=""/>
             </a:pPr>
             <a:r>
               <a:rPr lang="en-US" sz="2600">
@@ -10051,9 +10076,9 @@
               <a:lnSpc>
                 <a:spcPct val="100000"/>
               </a:lnSpc>
-              <a:buSzPct val="45000"/>
+              <a:buSzPct val="60000"/>
               <a:buFont typeface="StarSymbol"/>
-              <a:buChar char="l"/>
+              <a:buChar char=""/>
             </a:pPr>
             <a:r>
               <a:rPr lang="en-US" sz="2600">
@@ -10078,7 +10103,7 @@
       </p:sp>
       <p:pic>
         <p:nvPicPr>
-          <p:cNvPr id="81" name="" descr=""/>
+          <p:cNvPr id="82" name="" descr=""/>
           <p:cNvPicPr/>
           <p:nvPr/>
         </p:nvPicPr>
@@ -10091,7 +10116,7 @@
         <p:spPr>
           <a:xfrm>
             <a:off x="27614880" y="8321040"/>
-            <a:ext cx="2793240" cy="731880"/>
+            <a:ext cx="2792880" cy="731520"/>
           </a:xfrm>
           <a:prstGeom prst="rect">
             <a:avLst/>
@@ -10103,7 +10128,7 @@
       </p:pic>
       <p:pic>
         <p:nvPicPr>
-          <p:cNvPr id="82" name="" descr=""/>
+          <p:cNvPr id="83" name="" descr=""/>
           <p:cNvPicPr/>
           <p:nvPr/>
         </p:nvPicPr>
@@ -10116,7 +10141,7 @@
         <p:spPr>
           <a:xfrm>
             <a:off x="26174160" y="11244240"/>
-            <a:ext cx="7772040" cy="1108800"/>
+            <a:ext cx="7771680" cy="1108440"/>
           </a:xfrm>
           <a:prstGeom prst="rect">
             <a:avLst/>
@@ -10128,14 +10153,14 @@
       </p:pic>
       <p:sp>
         <p:nvSpPr>
-          <p:cNvPr id="83" name="CustomShape 33"/>
+          <p:cNvPr id="84" name="CustomShape 34"/>
           <p:cNvSpPr/>
           <p:nvPr/>
         </p:nvSpPr>
         <p:spPr>
           <a:xfrm>
             <a:off x="11979000" y="5973840"/>
-            <a:ext cx="11246400" cy="8930520"/>
+            <a:ext cx="11246040" cy="8930160"/>
           </a:xfrm>
           <a:prstGeom prst="rect">
             <a:avLst/>
@@ -10215,9 +10240,9 @@
               <a:lnSpc>
                 <a:spcPct val="100000"/>
               </a:lnSpc>
-              <a:buSzPct val="45000"/>
+              <a:buSzPct val="60000"/>
               <a:buFont typeface="StarSymbol"/>
-              <a:buChar char="l"/>
+              <a:buChar char=""/>
             </a:pPr>
             <a:r>
               <a:rPr lang="en-US" sz="2600">
@@ -10235,9 +10260,9 @@
               <a:lnSpc>
                 <a:spcPct val="100000"/>
               </a:lnSpc>
-              <a:buSzPct val="45000"/>
+              <a:buSzPct val="60000"/>
               <a:buFont typeface="StarSymbol"/>
-              <a:buChar char="l"/>
+              <a:buChar char=""/>
             </a:pPr>
             <a:r>
               <a:rPr lang="en-US" sz="2600">
@@ -10255,9 +10280,9 @@
               <a:lnSpc>
                 <a:spcPct val="100000"/>
               </a:lnSpc>
-              <a:buSzPct val="45000"/>
+              <a:buSzPct val="60000"/>
               <a:buFont typeface="StarSymbol"/>
-              <a:buChar char="l"/>
+              <a:buChar char=""/>
             </a:pPr>
             <a:r>
               <a:rPr lang="en-US" sz="2600">
@@ -10275,9 +10300,9 @@
               <a:lnSpc>
                 <a:spcPct val="100000"/>
               </a:lnSpc>
-              <a:buSzPct val="45000"/>
+              <a:buSzPct val="60000"/>
               <a:buFont typeface="StarSymbol"/>
-              <a:buChar char="l"/>
+              <a:buChar char=""/>
             </a:pPr>
             <a:r>
               <a:rPr lang="en-US" sz="2600">
@@ -10344,7 +10369,7 @@
       </p:sp>
       <p:pic>
         <p:nvPicPr>
-          <p:cNvPr id="84" name="" descr=""/>
+          <p:cNvPr id="85" name="" descr=""/>
           <p:cNvPicPr/>
           <p:nvPr/>
         </p:nvPicPr>
@@ -10357,7 +10382,7 @@
         <p:spPr>
           <a:xfrm>
             <a:off x="15171840" y="7406640"/>
-            <a:ext cx="4970880" cy="874440"/>
+            <a:ext cx="4970520" cy="874080"/>
           </a:xfrm>
           <a:prstGeom prst="rect">
             <a:avLst/>
@@ -10369,14 +10394,14 @@
       </p:pic>
       <p:sp>
         <p:nvSpPr>
-          <p:cNvPr id="85" name="CustomShape 34"/>
+          <p:cNvPr id="86" name="CustomShape 35"/>
           <p:cNvSpPr/>
           <p:nvPr/>
         </p:nvSpPr>
         <p:spPr>
           <a:xfrm>
             <a:off x="12197520" y="6968880"/>
-            <a:ext cx="1737000" cy="345960"/>
+            <a:ext cx="1736640" cy="345600"/>
           </a:xfrm>
           <a:prstGeom prst="rect">
             <a:avLst/>
@@ -10401,14 +10426,14 @@
       </p:sp>
       <p:sp>
         <p:nvSpPr>
-          <p:cNvPr id="86" name="CustomShape 35"/>
+          <p:cNvPr id="87" name="CustomShape 36"/>
           <p:cNvSpPr/>
           <p:nvPr/>
         </p:nvSpPr>
         <p:spPr>
           <a:xfrm>
             <a:off x="21929040" y="6603120"/>
-            <a:ext cx="639720" cy="345960"/>
+            <a:ext cx="639360" cy="345600"/>
           </a:xfrm>
           <a:prstGeom prst="rect">
             <a:avLst/>
@@ -10433,14 +10458,14 @@
       </p:sp>
       <p:sp>
         <p:nvSpPr>
-          <p:cNvPr id="87" name="CustomShape 36"/>
+          <p:cNvPr id="88" name="CustomShape 37"/>
           <p:cNvSpPr/>
           <p:nvPr/>
         </p:nvSpPr>
         <p:spPr>
           <a:xfrm>
             <a:off x="19019520" y="10149840"/>
-            <a:ext cx="1828440" cy="345960"/>
+            <a:ext cx="1828080" cy="345600"/>
           </a:xfrm>
           <a:prstGeom prst="rect">
             <a:avLst/>
@@ -10465,14 +10490,14 @@
       </p:sp>
       <p:sp>
         <p:nvSpPr>
-          <p:cNvPr id="88" name="CustomShape 37"/>
+          <p:cNvPr id="89" name="CustomShape 38"/>
           <p:cNvSpPr/>
           <p:nvPr/>
         </p:nvSpPr>
         <p:spPr>
           <a:xfrm>
             <a:off x="16788960" y="10535040"/>
-            <a:ext cx="1096920" cy="345960"/>
+            <a:ext cx="1096560" cy="345600"/>
           </a:xfrm>
           <a:prstGeom prst="rect">
             <a:avLst/>
@@ -10497,14 +10522,14 @@
       </p:sp>
       <p:sp>
         <p:nvSpPr>
-          <p:cNvPr id="89" name="CustomShape 38"/>
+          <p:cNvPr id="90" name="CustomShape 39"/>
           <p:cNvSpPr/>
           <p:nvPr/>
         </p:nvSpPr>
         <p:spPr>
           <a:xfrm>
             <a:off x="20224800" y="16093440"/>
-            <a:ext cx="2102760" cy="2285640"/>
+            <a:ext cx="2102400" cy="2285280"/>
           </a:xfrm>
           <a:prstGeom prst="rect">
             <a:avLst/>

</xml_diff>